<commit_message>
Deployed ff65089d to 0.8 with MkDocs 1.2.3 and mike 1.1.2
</commit_message>
<xml_diff>
--- a/0.8/images/src/illustration.pptx
+++ b/0.8/images/src/illustration.pptx
@@ -14,7 +14,7 @@
     <p:sldId id="378" r:id="rId5"/>
     <p:sldId id="379" r:id="rId6"/>
     <p:sldId id="385" r:id="rId7"/>
-    <p:sldId id="387" r:id="rId8"/>
+    <p:sldId id="386" r:id="rId8"/>
   </p:sldIdLst>
   <p:sldSz cx="12192000" cy="6858000"/>
   <p:notesSz cx="6858000" cy="9144000"/>
@@ -1048,7 +1048,7 @@
     </p:spTree>
     <p:extLst>
       <p:ext uri="{BB962C8B-B14F-4D97-AF65-F5344CB8AC3E}">
-        <p14:creationId xmlns:p14="http://schemas.microsoft.com/office/powerpoint/2010/main" val="4184170233"/>
+        <p14:creationId xmlns:p14="http://schemas.microsoft.com/office/powerpoint/2010/main" val="4259050774"/>
       </p:ext>
     </p:extLst>
   </p:cSld>
@@ -9552,7 +9552,7 @@
         <p:spPr>
           <a:xfrm>
             <a:off x="2712578" y="2889486"/>
-            <a:ext cx="2143201" cy="338554"/>
+            <a:ext cx="1838401" cy="584775"/>
           </a:xfrm>
           <a:prstGeom prst="rect">
             <a:avLst/>
@@ -9597,8 +9597,10 @@
                   </a:outerShdw>
                 </a:effectLst>
               </a:rPr>
-              <a:t>Load testing</a:t>
-            </a:r>
+              <a:t>Load testing/SLOs</a:t>
+            </a:r>
+          </a:p>
+          <a:p>
             <a:r>
               <a:rPr lang="en-US" sz="1600" dirty="0">
                 <a:gradFill>
@@ -9624,34 +9626,7 @@
                   </a:outerShdw>
                 </a:effectLst>
               </a:rPr>
-              <a:t> with </a:t>
-            </a:r>
-            <a:r>
-              <a:rPr lang="en-US" sz="1600" b="1" dirty="0">
-                <a:gradFill>
-                  <a:gsLst>
-                    <a:gs pos="0">
-                      <a:schemeClr val="accent4">
-                        <a:lumMod val="20000"/>
-                        <a:lumOff val="80000"/>
-                      </a:schemeClr>
-                    </a:gs>
-                    <a:gs pos="99000">
-                      <a:schemeClr val="bg1"/>
-                    </a:gs>
-                  </a:gsLst>
-                  <a:lin ang="0" scaled="0"/>
-                </a:gradFill>
-                <a:effectLst>
-                  <a:outerShdw blurRad="50800" dist="38100" dir="2700000" algn="tl" rotWithShape="0">
-                    <a:schemeClr val="accent4">
-                      <a:lumMod val="75000"/>
-                      <a:alpha val="40000"/>
-                    </a:schemeClr>
-                  </a:outerShdw>
-                </a:effectLst>
-              </a:rPr>
-              <a:t>SLOs</a:t>
+              <a:t>with built-in metrics</a:t>
             </a:r>
           </a:p>
         </p:txBody>
@@ -9670,8 +9645,8 @@
         </p:nvSpPr>
         <p:spPr>
           <a:xfrm>
-            <a:off x="6785918" y="3068282"/>
-            <a:ext cx="2487820" cy="584775"/>
+            <a:off x="7262272" y="3068282"/>
+            <a:ext cx="2011466" cy="584775"/>
           </a:xfrm>
           <a:prstGeom prst="rect">
             <a:avLst/>
@@ -9719,6 +9694,9 @@
               </a:rPr>
               <a:t>A/B(/n) testing</a:t>
             </a:r>
+          </a:p>
+          <a:p>
+            <a:pPr algn="r"/>
             <a:r>
               <a:rPr lang="en-US" sz="1600" dirty="0">
                 <a:gradFill>
@@ -9744,7 +9722,7 @@
                   </a:outerShdw>
                 </a:effectLst>
               </a:rPr>
-              <a:t> with business metrics</a:t>
+              <a:t>with business metrics</a:t>
             </a:r>
           </a:p>
         </p:txBody>
@@ -10454,7 +10432,7 @@
         <p:spPr>
           <a:xfrm>
             <a:off x="2712578" y="2889486"/>
-            <a:ext cx="2143201" cy="338554"/>
+            <a:ext cx="1838401" cy="584775"/>
           </a:xfrm>
           <a:prstGeom prst="rect">
             <a:avLst/>
@@ -10499,8 +10477,10 @@
                   </a:outerShdw>
                 </a:effectLst>
               </a:rPr>
-              <a:t>Load testing</a:t>
-            </a:r>
+              <a:t>Load testing/SLOs</a:t>
+            </a:r>
+          </a:p>
+          <a:p>
             <a:r>
               <a:rPr lang="en-US" sz="1600" dirty="0">
                 <a:gradFill>
@@ -10526,34 +10506,7 @@
                   </a:outerShdw>
                 </a:effectLst>
               </a:rPr>
-              <a:t> with </a:t>
-            </a:r>
-            <a:r>
-              <a:rPr lang="en-US" sz="1600" b="1" dirty="0">
-                <a:gradFill>
-                  <a:gsLst>
-                    <a:gs pos="0">
-                      <a:schemeClr val="accent4">
-                        <a:lumMod val="20000"/>
-                        <a:lumOff val="80000"/>
-                      </a:schemeClr>
-                    </a:gs>
-                    <a:gs pos="99000">
-                      <a:schemeClr val="bg1"/>
-                    </a:gs>
-                  </a:gsLst>
-                  <a:lin ang="0" scaled="0"/>
-                </a:gradFill>
-                <a:effectLst>
-                  <a:outerShdw blurRad="50800" dist="38100" dir="2700000" algn="tl" rotWithShape="0">
-                    <a:schemeClr val="accent4">
-                      <a:lumMod val="75000"/>
-                      <a:alpha val="40000"/>
-                    </a:schemeClr>
-                  </a:outerShdw>
-                </a:effectLst>
-              </a:rPr>
-              <a:t>SLOs</a:t>
+              <a:t>with built-in metrics</a:t>
             </a:r>
           </a:p>
         </p:txBody>
@@ -10572,8 +10525,8 @@
         </p:nvSpPr>
         <p:spPr>
           <a:xfrm>
-            <a:off x="6785918" y="3068282"/>
-            <a:ext cx="2487820" cy="584775"/>
+            <a:off x="7262272" y="3068282"/>
+            <a:ext cx="2011466" cy="584775"/>
           </a:xfrm>
           <a:prstGeom prst="rect">
             <a:avLst/>
@@ -10621,6 +10574,9 @@
               </a:rPr>
               <a:t>A/B(/n) testing</a:t>
             </a:r>
+          </a:p>
+          <a:p>
+            <a:pPr algn="r"/>
             <a:r>
               <a:rPr lang="en-US" sz="1600" dirty="0">
                 <a:gradFill>
@@ -10646,7 +10602,7 @@
                   </a:outerShdw>
                 </a:effectLst>
               </a:rPr>
-              <a:t> with business metrics</a:t>
+              <a:t>with business metrics</a:t>
             </a:r>
           </a:p>
         </p:txBody>
@@ -10877,7 +10833,7 @@
     </p:spTree>
     <p:extLst>
       <p:ext uri="{BB962C8B-B14F-4D97-AF65-F5344CB8AC3E}">
-        <p14:creationId xmlns:p14="http://schemas.microsoft.com/office/powerpoint/2010/main" val="4292317971"/>
+        <p14:creationId xmlns:p14="http://schemas.microsoft.com/office/powerpoint/2010/main" val="2058438647"/>
       </p:ext>
     </p:extLst>
   </p:cSld>

</xml_diff>

<commit_message>
Deployed d13f63f3 to 0.8 with MkDocs 1.2.3 and mike 1.1.2
</commit_message>
<xml_diff>
--- a/0.8/images/src/illustration.pptx
+++ b/0.8/images/src/illustration.pptx
@@ -13,8 +13,8 @@
     <p:sldId id="376" r:id="rId4"/>
     <p:sldId id="378" r:id="rId5"/>
     <p:sldId id="379" r:id="rId6"/>
-    <p:sldId id="385" r:id="rId7"/>
-    <p:sldId id="386" r:id="rId8"/>
+    <p:sldId id="386" r:id="rId7"/>
+    <p:sldId id="387" r:id="rId8"/>
   </p:sldIdLst>
   <p:sldSz cx="12192000" cy="6858000"/>
   <p:notesSz cx="6858000" cy="9144000"/>
@@ -203,7 +203,7 @@
           <a:p>
             <a:fld id="{38B78CBE-37FA-D241-BB4C-CAC5D3B25F49}" type="datetimeFigureOut">
               <a:rPr lang="en-US" smtClean="0"/>
-              <a:t>12/15/21</a:t>
+              <a:t>12/17/21</a:t>
             </a:fld>
             <a:endParaRPr lang="en-US"/>
           </a:p>
@@ -964,7 +964,7 @@
     </p:spTree>
     <p:extLst>
       <p:ext uri="{BB962C8B-B14F-4D97-AF65-F5344CB8AC3E}">
-        <p14:creationId xmlns:p14="http://schemas.microsoft.com/office/powerpoint/2010/main" val="3283311487"/>
+        <p14:creationId xmlns:p14="http://schemas.microsoft.com/office/powerpoint/2010/main" val="1572782677"/>
       </p:ext>
     </p:extLst>
   </p:cSld>
@@ -1048,7 +1048,7 @@
     </p:spTree>
     <p:extLst>
       <p:ext uri="{BB962C8B-B14F-4D97-AF65-F5344CB8AC3E}">
-        <p14:creationId xmlns:p14="http://schemas.microsoft.com/office/powerpoint/2010/main" val="4259050774"/>
+        <p14:creationId xmlns:p14="http://schemas.microsoft.com/office/powerpoint/2010/main" val="178661305"/>
       </p:ext>
     </p:extLst>
   </p:cSld>
@@ -1205,7 +1205,7 @@
           <a:p>
             <a:fld id="{708812C5-0212-FD42-A0D4-E2E8FF4E3AF5}" type="datetime1">
               <a:rPr lang="en-US" smtClean="0"/>
-              <a:t>12/15/21</a:t>
+              <a:t>12/17/21</a:t>
             </a:fld>
             <a:endParaRPr lang="en-US"/>
           </a:p>
@@ -1406,7 +1406,7 @@
           <a:p>
             <a:fld id="{D232AC6F-41C3-B34B-9BAA-03ED2F3BC0F6}" type="datetime1">
               <a:rPr lang="en-US" smtClean="0"/>
-              <a:t>12/15/21</a:t>
+              <a:t>12/17/21</a:t>
             </a:fld>
             <a:endParaRPr lang="en-US"/>
           </a:p>
@@ -1617,7 +1617,7 @@
           <a:p>
             <a:fld id="{BEE140C2-F440-9D49-95CB-5965D64CC4A2}" type="datetime1">
               <a:rPr lang="en-US" smtClean="0"/>
-              <a:t>12/15/21</a:t>
+              <a:t>12/17/21</a:t>
             </a:fld>
             <a:endParaRPr lang="en-US"/>
           </a:p>
@@ -1818,7 +1818,7 @@
           <a:p>
             <a:fld id="{CC99F980-FB29-FD47-8508-150F73F1E8B0}" type="datetime1">
               <a:rPr lang="en-US" smtClean="0"/>
-              <a:t>12/15/21</a:t>
+              <a:t>12/17/21</a:t>
             </a:fld>
             <a:endParaRPr lang="en-US"/>
           </a:p>
@@ -2096,7 +2096,7 @@
           <a:p>
             <a:fld id="{D4510983-EA22-9643-8AC0-B3C6499B643B}" type="datetime1">
               <a:rPr lang="en-US" smtClean="0"/>
-              <a:t>12/15/21</a:t>
+              <a:t>12/17/21</a:t>
             </a:fld>
             <a:endParaRPr lang="en-US"/>
           </a:p>
@@ -2364,7 +2364,7 @@
           <a:p>
             <a:fld id="{D5A39195-967D-5D4E-8C6A-C99866996458}" type="datetime1">
               <a:rPr lang="en-US" smtClean="0"/>
-              <a:t>12/15/21</a:t>
+              <a:t>12/17/21</a:t>
             </a:fld>
             <a:endParaRPr lang="en-US"/>
           </a:p>
@@ -2779,7 +2779,7 @@
           <a:p>
             <a:fld id="{5AD771E9-C79D-684D-A158-5EB6E92DE947}" type="datetime1">
               <a:rPr lang="en-US" smtClean="0"/>
-              <a:t>12/15/21</a:t>
+              <a:t>12/17/21</a:t>
             </a:fld>
             <a:endParaRPr lang="en-US"/>
           </a:p>
@@ -2923,7 +2923,7 @@
           <a:p>
             <a:fld id="{693CA161-7E4C-5C4B-B799-DB602A0B9806}" type="datetime1">
               <a:rPr lang="en-US" smtClean="0"/>
-              <a:t>12/15/21</a:t>
+              <a:t>12/17/21</a:t>
             </a:fld>
             <a:endParaRPr lang="en-US"/>
           </a:p>
@@ -3039,7 +3039,7 @@
           <a:p>
             <a:fld id="{6D55FDF3-8BB2-6349-A5FA-057F3D78953D}" type="datetime1">
               <a:rPr lang="en-US" smtClean="0"/>
-              <a:t>12/15/21</a:t>
+              <a:t>12/17/21</a:t>
             </a:fld>
             <a:endParaRPr lang="en-US"/>
           </a:p>
@@ -3353,7 +3353,7 @@
           <a:p>
             <a:fld id="{EEDFACC0-3228-BA4B-942E-CEF38B0101FD}" type="datetime1">
               <a:rPr lang="en-US" smtClean="0"/>
-              <a:t>12/15/21</a:t>
+              <a:t>12/17/21</a:t>
             </a:fld>
             <a:endParaRPr lang="en-US"/>
           </a:p>
@@ -3644,7 +3644,7 @@
           <a:p>
             <a:fld id="{07EEEDBE-E24C-D140-B419-6D8D592D0F1C}" type="datetime1">
               <a:rPr lang="en-US" smtClean="0"/>
-              <a:t>12/15/21</a:t>
+              <a:t>12/17/21</a:t>
             </a:fld>
             <a:endParaRPr lang="en-US"/>
           </a:p>
@@ -3888,7 +3888,7 @@
           <a:p>
             <a:fld id="{E05781A2-A5EF-C54C-A3EF-F62483D37EDC}" type="datetime1">
               <a:rPr lang="en-US" smtClean="0"/>
-              <a:t>12/15/21</a:t>
+              <a:t>12/17/21</a:t>
             </a:fld>
             <a:endParaRPr lang="en-US"/>
           </a:p>
@@ -9045,8 +9045,8 @@
         </p:nvSpPr>
         <p:spPr>
           <a:xfrm>
-            <a:off x="2438397" y="1639614"/>
-            <a:ext cx="7315200" cy="3447393"/>
+            <a:off x="2438397" y="1639613"/>
+            <a:ext cx="7315204" cy="3321269"/>
           </a:xfrm>
           <a:prstGeom prst="roundRect">
             <a:avLst/>
@@ -9116,7 +9116,7 @@
         </p:nvSpPr>
         <p:spPr>
           <a:xfrm>
-            <a:off x="5528064" y="2719254"/>
+            <a:off x="5528064" y="2551089"/>
             <a:ext cx="1115568" cy="1118950"/>
           </a:xfrm>
           <a:prstGeom prst="ellipse">
@@ -9191,7 +9191,7 @@
         </p:blipFill>
         <p:spPr>
           <a:xfrm>
-            <a:off x="5711261" y="2892139"/>
+            <a:off x="5711261" y="2723974"/>
             <a:ext cx="746070" cy="746070"/>
           </a:xfrm>
           <a:prstGeom prst="rect">
@@ -9223,8 +9223,8 @@
         </p:nvCxnSpPr>
         <p:spPr>
           <a:xfrm flipH="1" flipV="1">
-            <a:off x="2816772" y="2876683"/>
-            <a:ext cx="2874663" cy="6437"/>
+            <a:off x="2743200" y="2712820"/>
+            <a:ext cx="2948235" cy="2135"/>
           </a:xfrm>
           <a:prstGeom prst="straightConnector1">
             <a:avLst/>
@@ -9273,8 +9273,8 @@
         </p:nvSpPr>
         <p:spPr>
           <a:xfrm>
-            <a:off x="4130562" y="4300629"/>
-            <a:ext cx="3930870" cy="584775"/>
+            <a:off x="4456388" y="4165260"/>
+            <a:ext cx="3273336" cy="707886"/>
           </a:xfrm>
           <a:prstGeom prst="rect">
             <a:avLst/>
@@ -9296,7 +9296,7 @@
           <a:p>
             <a:pPr algn="ctr"/>
             <a:r>
-              <a:rPr lang="en-US" sz="1600" dirty="0">
+              <a:rPr lang="en-US" sz="2000" dirty="0">
                 <a:gradFill>
                   <a:gsLst>
                     <a:gs pos="0">
@@ -9323,7 +9323,7 @@
               <a:t>Run </a:t>
             </a:r>
             <a:r>
-              <a:rPr lang="en-US" sz="1600" b="1" dirty="0">
+              <a:rPr lang="en-US" sz="2000" b="1" dirty="0">
                 <a:gradFill>
                   <a:gsLst>
                     <a:gs pos="0">
@@ -9347,10 +9347,10 @@
                   </a:outerShdw>
                 </a:effectLst>
               </a:rPr>
-              <a:t>anywhere</a:t>
-            </a:r>
-            <a:r>
-              <a:rPr lang="en-US" sz="1600" dirty="0">
+              <a:t>locally</a:t>
+            </a:r>
+            <a:r>
+              <a:rPr lang="en-US" sz="2000" dirty="0">
                 <a:gradFill>
                   <a:gsLst>
                     <a:gs pos="0">
@@ -9374,7 +9374,145 @@
                   </a:outerShdw>
                 </a:effectLst>
               </a:rPr>
-              <a:t>. Local. Container. Kubernetes. CI/CD/GitOps pipeline.</a:t>
+              <a:t> or in </a:t>
+            </a:r>
+            <a:r>
+              <a:rPr lang="en-US" sz="2000" b="1" dirty="0">
+                <a:gradFill>
+                  <a:gsLst>
+                    <a:gs pos="0">
+                      <a:schemeClr val="accent4">
+                        <a:lumMod val="20000"/>
+                        <a:lumOff val="80000"/>
+                      </a:schemeClr>
+                    </a:gs>
+                    <a:gs pos="99000">
+                      <a:schemeClr val="bg1"/>
+                    </a:gs>
+                  </a:gsLst>
+                  <a:lin ang="0" scaled="0"/>
+                </a:gradFill>
+                <a:effectLst>
+                  <a:outerShdw blurRad="50800" dist="38100" dir="2700000" algn="tl" rotWithShape="0">
+                    <a:schemeClr val="accent4">
+                      <a:lumMod val="75000"/>
+                      <a:alpha val="40000"/>
+                    </a:schemeClr>
+                  </a:outerShdw>
+                </a:effectLst>
+              </a:rPr>
+              <a:t>Kubernetes</a:t>
+            </a:r>
+            <a:r>
+              <a:rPr lang="en-US" sz="2000" dirty="0">
+                <a:gradFill>
+                  <a:gsLst>
+                    <a:gs pos="0">
+                      <a:schemeClr val="accent4">
+                        <a:lumMod val="20000"/>
+                        <a:lumOff val="80000"/>
+                      </a:schemeClr>
+                    </a:gs>
+                    <a:gs pos="99000">
+                      <a:schemeClr val="bg1"/>
+                    </a:gs>
+                  </a:gsLst>
+                  <a:lin ang="0" scaled="0"/>
+                </a:gradFill>
+                <a:effectLst>
+                  <a:outerShdw blurRad="50800" dist="38100" dir="2700000" algn="tl" rotWithShape="0">
+                    <a:schemeClr val="accent4">
+                      <a:lumMod val="75000"/>
+                      <a:alpha val="40000"/>
+                    </a:schemeClr>
+                  </a:outerShdw>
+                </a:effectLst>
+              </a:rPr>
+              <a:t> </a:t>
+            </a:r>
+          </a:p>
+          <a:p>
+            <a:pPr algn="ctr"/>
+            <a:r>
+              <a:rPr lang="en-US" sz="2000" b="1" dirty="0">
+                <a:gradFill>
+                  <a:gsLst>
+                    <a:gs pos="0">
+                      <a:schemeClr val="accent4">
+                        <a:lumMod val="20000"/>
+                        <a:lumOff val="80000"/>
+                      </a:schemeClr>
+                    </a:gs>
+                    <a:gs pos="99000">
+                      <a:schemeClr val="bg1"/>
+                    </a:gs>
+                  </a:gsLst>
+                  <a:lin ang="0" scaled="0"/>
+                </a:gradFill>
+                <a:effectLst>
+                  <a:outerShdw blurRad="50800" dist="38100" dir="2700000" algn="tl" rotWithShape="0">
+                    <a:schemeClr val="accent4">
+                      <a:lumMod val="75000"/>
+                      <a:alpha val="40000"/>
+                    </a:schemeClr>
+                  </a:outerShdw>
+                </a:effectLst>
+              </a:rPr>
+              <a:t>Notifications </a:t>
+            </a:r>
+            <a:r>
+              <a:rPr lang="en-US" sz="2000" dirty="0">
+                <a:gradFill>
+                  <a:gsLst>
+                    <a:gs pos="0">
+                      <a:schemeClr val="accent4">
+                        <a:lumMod val="20000"/>
+                        <a:lumOff val="80000"/>
+                      </a:schemeClr>
+                    </a:gs>
+                    <a:gs pos="99000">
+                      <a:schemeClr val="bg1"/>
+                    </a:gs>
+                  </a:gsLst>
+                  <a:lin ang="0" scaled="0"/>
+                </a:gradFill>
+                <a:effectLst>
+                  <a:outerShdw blurRad="50800" dist="38100" dir="2700000" algn="tl" rotWithShape="0">
+                    <a:schemeClr val="accent4">
+                      <a:lumMod val="75000"/>
+                      <a:alpha val="40000"/>
+                    </a:schemeClr>
+                  </a:outerShdw>
+                </a:effectLst>
+              </a:rPr>
+              <a:t>&amp;</a:t>
+            </a:r>
+            <a:r>
+              <a:rPr lang="en-US" sz="2000" b="1" dirty="0">
+                <a:gradFill>
+                  <a:gsLst>
+                    <a:gs pos="0">
+                      <a:schemeClr val="accent4">
+                        <a:lumMod val="20000"/>
+                        <a:lumOff val="80000"/>
+                      </a:schemeClr>
+                    </a:gs>
+                    <a:gs pos="99000">
+                      <a:schemeClr val="bg1"/>
+                    </a:gs>
+                  </a:gsLst>
+                  <a:lin ang="0" scaled="0"/>
+                </a:gradFill>
+                <a:effectLst>
+                  <a:outerShdw blurRad="50800" dist="38100" dir="2700000" algn="tl" rotWithShape="0">
+                    <a:schemeClr val="accent4">
+                      <a:lumMod val="75000"/>
+                      <a:alpha val="40000"/>
+                    </a:schemeClr>
+                  </a:outerShdw>
+                </a:effectLst>
+              </a:rPr>
+              <a:t> Reporting</a:t>
             </a:r>
           </a:p>
         </p:txBody>
@@ -9391,14 +9529,13 @@
           <p:cNvCxnSpPr>
             <a:cxnSpLocks/>
             <a:stCxn id="45" idx="4"/>
-            <a:endCxn id="86" idx="0"/>
           </p:cNvCxnSpPr>
           <p:nvPr/>
         </p:nvCxnSpPr>
         <p:spPr>
           <a:xfrm>
-            <a:off x="6085848" y="3838204"/>
-            <a:ext cx="10149" cy="462425"/>
+            <a:off x="6085848" y="3670039"/>
+            <a:ext cx="0" cy="475141"/>
           </a:xfrm>
           <a:prstGeom prst="straightConnector1">
             <a:avLst/>
@@ -9445,7 +9582,7 @@
         </p:nvCxnSpPr>
         <p:spPr>
           <a:xfrm flipH="1">
-            <a:off x="4726272" y="4278346"/>
+            <a:off x="4737976" y="4145180"/>
             <a:ext cx="2716047" cy="0"/>
           </a:xfrm>
           <a:prstGeom prst="straightConnector1">
@@ -9484,59 +9621,6 @@
           </a:fontRef>
         </p:style>
       </p:cxnSp>
-      <p:cxnSp>
-        <p:nvCxnSpPr>
-          <p:cNvPr id="33" name="Straight Arrow Connector 32">
-            <a:extLst>
-              <a:ext uri="{FF2B5EF4-FFF2-40B4-BE49-F238E27FC236}">
-                <a16:creationId xmlns:a16="http://schemas.microsoft.com/office/drawing/2014/main" id="{FD43408C-8FD1-2A45-BAFA-7C30E55C1B43}"/>
-              </a:ext>
-            </a:extLst>
-          </p:cNvPr>
-          <p:cNvCxnSpPr>
-            <a:cxnSpLocks/>
-            <a:stCxn id="45" idx="5"/>
-          </p:cNvCxnSpPr>
-          <p:nvPr/>
-        </p:nvCxnSpPr>
-        <p:spPr>
-          <a:xfrm>
-            <a:off x="6480261" y="3674338"/>
-            <a:ext cx="2793477" cy="0"/>
-          </a:xfrm>
-          <a:prstGeom prst="straightConnector1">
-            <a:avLst/>
-          </a:prstGeom>
-          <a:ln w="31750">
-            <a:gradFill>
-              <a:gsLst>
-                <a:gs pos="0">
-                  <a:schemeClr val="bg1"/>
-                </a:gs>
-                <a:gs pos="100000">
-                  <a:srgbClr val="B70703"/>
-                </a:gs>
-              </a:gsLst>
-              <a:lin ang="0" scaled="0"/>
-            </a:gradFill>
-            <a:tailEnd type="none"/>
-          </a:ln>
-        </p:spPr>
-        <p:style>
-          <a:lnRef idx="1">
-            <a:schemeClr val="accent1"/>
-          </a:lnRef>
-          <a:fillRef idx="0">
-            <a:schemeClr val="accent1"/>
-          </a:fillRef>
-          <a:effectRef idx="0">
-            <a:schemeClr val="accent1"/>
-          </a:effectRef>
-          <a:fontRef idx="minor">
-            <a:schemeClr val="tx1"/>
-          </a:fontRef>
-        </p:style>
-      </p:cxnSp>
       <p:sp>
         <p:nvSpPr>
           <p:cNvPr id="21" name="TextBox 20">
@@ -9551,8 +9635,8 @@
         </p:nvSpPr>
         <p:spPr>
           <a:xfrm>
-            <a:off x="2712578" y="2889486"/>
-            <a:ext cx="1838401" cy="584775"/>
+            <a:off x="2650292" y="2725465"/>
+            <a:ext cx="2436343" cy="707886"/>
           </a:xfrm>
           <a:prstGeom prst="rect">
             <a:avLst/>
@@ -9573,7 +9657,7 @@
           <a:lstStyle/>
           <a:p>
             <a:r>
-              <a:rPr lang="en-US" sz="1600" b="1" dirty="0">
+              <a:rPr lang="en-US" sz="2000" b="1" dirty="0">
                 <a:gradFill>
                   <a:gsLst>
                     <a:gs pos="0">
@@ -9597,12 +9681,12 @@
                   </a:outerShdw>
                 </a:effectLst>
               </a:rPr>
-              <a:t>Load testing/SLOs</a:t>
-            </a:r>
-          </a:p>
-          <a:p>
-            <a:r>
-              <a:rPr lang="en-US" sz="1600" dirty="0">
+              <a:t>Load testing</a:t>
+            </a:r>
+          </a:p>
+          <a:p>
+            <a:r>
+              <a:rPr lang="en-US" sz="2000" dirty="0">
                 <a:gradFill>
                   <a:gsLst>
                     <a:gs pos="0">
@@ -9626,7 +9710,7 @@
                   </a:outerShdw>
                 </a:effectLst>
               </a:rPr>
-              <a:t>with built-in metrics</a:t>
+              <a:t>with SLO validation</a:t>
             </a:r>
           </a:p>
         </p:txBody>
@@ -9645,8 +9729,8 @@
         </p:nvSpPr>
         <p:spPr>
           <a:xfrm>
-            <a:off x="7262272" y="3068282"/>
-            <a:ext cx="2011466" cy="584775"/>
+            <a:off x="6826829" y="2777831"/>
+            <a:ext cx="2596059" cy="707886"/>
           </a:xfrm>
           <a:prstGeom prst="rect">
             <a:avLst/>
@@ -9668,7 +9752,7 @@
           <a:p>
             <a:pPr algn="r"/>
             <a:r>
-              <a:rPr lang="en-US" sz="1600" b="1" dirty="0">
+              <a:rPr lang="en-US" sz="2000" b="1" dirty="0">
                 <a:gradFill>
                   <a:gsLst>
                     <a:gs pos="0">
@@ -9698,7 +9782,7 @@
           <a:p>
             <a:pPr algn="r"/>
             <a:r>
-              <a:rPr lang="en-US" sz="1600" dirty="0">
+              <a:rPr lang="en-US" sz="2000" dirty="0">
                 <a:gradFill>
                   <a:gsLst>
                     <a:gs pos="0">
@@ -9722,7 +9806,7 @@
                   </a:outerShdw>
                 </a:effectLst>
               </a:rPr>
-              <a:t>with business metrics</a:t>
+              <a:t>for business growth</a:t>
             </a:r>
           </a:p>
         </p:txBody>
@@ -9743,8 +9827,8 @@
         </p:nvCxnSpPr>
         <p:spPr>
           <a:xfrm>
-            <a:off x="6079398" y="2273607"/>
-            <a:ext cx="4897" cy="442895"/>
+            <a:off x="6079398" y="2105442"/>
+            <a:ext cx="0" cy="442895"/>
           </a:xfrm>
           <a:prstGeom prst="straightConnector1">
             <a:avLst/>
@@ -9791,7 +9875,7 @@
         </p:nvCxnSpPr>
         <p:spPr>
           <a:xfrm flipH="1">
-            <a:off x="4721374" y="2273607"/>
+            <a:off x="4721374" y="2105442"/>
             <a:ext cx="2716047" cy="0"/>
           </a:xfrm>
           <a:prstGeom prst="straightConnector1">
@@ -9844,8 +9928,8 @@
         </p:nvSpPr>
         <p:spPr>
           <a:xfrm>
-            <a:off x="4046484" y="1899037"/>
-            <a:ext cx="4078014" cy="338554"/>
+            <a:off x="3677551" y="1696796"/>
+            <a:ext cx="4795573" cy="400110"/>
           </a:xfrm>
           <a:prstGeom prst="rect">
             <a:avLst/>
@@ -9867,7 +9951,7 @@
           <a:p>
             <a:pPr algn="ctr"/>
             <a:r>
-              <a:rPr lang="en-US" sz="1600" dirty="0">
+              <a:rPr lang="en-US" sz="2000" dirty="0">
                 <a:gradFill>
                   <a:gsLst>
                     <a:gs pos="0">
@@ -9894,7 +9978,7 @@
               <a:t>Use with </a:t>
             </a:r>
             <a:r>
-              <a:rPr lang="en-US" sz="1600" b="1" dirty="0">
+              <a:rPr lang="en-US" sz="2000" b="1" dirty="0">
                 <a:gradFill>
                   <a:gsLst>
                     <a:gs pos="0">
@@ -9921,7 +10005,7 @@
               <a:t>any </a:t>
             </a:r>
             <a:r>
-              <a:rPr lang="en-US" sz="1600" dirty="0">
+              <a:rPr lang="en-US" sz="2000" dirty="0">
                 <a:gradFill>
                   <a:gsLst>
                     <a:gs pos="0">
@@ -9945,15 +10029,68 @@
                   </a:outerShdw>
                 </a:effectLst>
               </a:rPr>
-              <a:t>app/serverless/ML framework. </a:t>
-            </a:r>
-          </a:p>
-        </p:txBody>
-      </p:sp>
+              <a:t>app/serverless/ML framework</a:t>
+            </a:r>
+          </a:p>
+        </p:txBody>
+      </p:sp>
+      <p:cxnSp>
+        <p:nvCxnSpPr>
+          <p:cNvPr id="17" name="Straight Arrow Connector 16">
+            <a:extLst>
+              <a:ext uri="{FF2B5EF4-FFF2-40B4-BE49-F238E27FC236}">
+                <a16:creationId xmlns:a16="http://schemas.microsoft.com/office/drawing/2014/main" id="{1F33487F-230E-394B-AC71-9D6DE82963E9}"/>
+              </a:ext>
+            </a:extLst>
+          </p:cNvPr>
+          <p:cNvCxnSpPr>
+            <a:cxnSpLocks/>
+            <a:endCxn id="45" idx="5"/>
+          </p:cNvCxnSpPr>
+          <p:nvPr/>
+        </p:nvCxnSpPr>
+        <p:spPr>
+          <a:xfrm flipH="1" flipV="1">
+            <a:off x="6480261" y="3506173"/>
+            <a:ext cx="2944368" cy="0"/>
+          </a:xfrm>
+          <a:prstGeom prst="straightConnector1">
+            <a:avLst/>
+          </a:prstGeom>
+          <a:ln w="31750">
+            <a:gradFill>
+              <a:gsLst>
+                <a:gs pos="0">
+                  <a:schemeClr val="bg1"/>
+                </a:gs>
+                <a:gs pos="100000">
+                  <a:srgbClr val="B70703"/>
+                </a:gs>
+              </a:gsLst>
+              <a:lin ang="0" scaled="0"/>
+            </a:gradFill>
+            <a:tailEnd type="none"/>
+          </a:ln>
+        </p:spPr>
+        <p:style>
+          <a:lnRef idx="1">
+            <a:schemeClr val="accent1"/>
+          </a:lnRef>
+          <a:fillRef idx="0">
+            <a:schemeClr val="accent1"/>
+          </a:fillRef>
+          <a:effectRef idx="0">
+            <a:schemeClr val="accent1"/>
+          </a:effectRef>
+          <a:fontRef idx="minor">
+            <a:schemeClr val="tx1"/>
+          </a:fontRef>
+        </p:style>
+      </p:cxnSp>
     </p:spTree>
     <p:extLst>
       <p:ext uri="{BB962C8B-B14F-4D97-AF65-F5344CB8AC3E}">
-        <p14:creationId xmlns:p14="http://schemas.microsoft.com/office/powerpoint/2010/main" val="3546969742"/>
+        <p14:creationId xmlns:p14="http://schemas.microsoft.com/office/powerpoint/2010/main" val="3682862473"/>
       </p:ext>
     </p:extLst>
   </p:cSld>
@@ -9996,7 +10133,7 @@
         </p:nvSpPr>
         <p:spPr>
           <a:xfrm>
-            <a:off x="5528064" y="2719254"/>
+            <a:off x="5528064" y="2551089"/>
             <a:ext cx="1115568" cy="1118950"/>
           </a:xfrm>
           <a:prstGeom prst="ellipse">
@@ -10071,7 +10208,7 @@
         </p:blipFill>
         <p:spPr>
           <a:xfrm>
-            <a:off x="5711261" y="2892139"/>
+            <a:off x="5711261" y="2723974"/>
             <a:ext cx="746070" cy="746070"/>
           </a:xfrm>
           <a:prstGeom prst="rect">
@@ -10103,8 +10240,8 @@
         </p:nvCxnSpPr>
         <p:spPr>
           <a:xfrm flipH="1" flipV="1">
-            <a:off x="2816772" y="2876683"/>
-            <a:ext cx="2874663" cy="6437"/>
+            <a:off x="2743200" y="2712820"/>
+            <a:ext cx="2948235" cy="2135"/>
           </a:xfrm>
           <a:prstGeom prst="straightConnector1">
             <a:avLst/>
@@ -10153,8 +10290,8 @@
         </p:nvSpPr>
         <p:spPr>
           <a:xfrm>
-            <a:off x="4130562" y="4300629"/>
-            <a:ext cx="3930870" cy="584775"/>
+            <a:off x="4456388" y="4165260"/>
+            <a:ext cx="3273336" cy="707886"/>
           </a:xfrm>
           <a:prstGeom prst="rect">
             <a:avLst/>
@@ -10176,7 +10313,7 @@
           <a:p>
             <a:pPr algn="ctr"/>
             <a:r>
-              <a:rPr lang="en-US" sz="1600" dirty="0">
+              <a:rPr lang="en-US" sz="2000" dirty="0">
                 <a:gradFill>
                   <a:gsLst>
                     <a:gs pos="0">
@@ -10203,7 +10340,7 @@
               <a:t>Run </a:t>
             </a:r>
             <a:r>
-              <a:rPr lang="en-US" sz="1600" b="1" dirty="0">
+              <a:rPr lang="en-US" sz="2000" b="1" dirty="0">
                 <a:gradFill>
                   <a:gsLst>
                     <a:gs pos="0">
@@ -10227,10 +10364,10 @@
                   </a:outerShdw>
                 </a:effectLst>
               </a:rPr>
-              <a:t>anywhere</a:t>
-            </a:r>
-            <a:r>
-              <a:rPr lang="en-US" sz="1600" dirty="0">
+              <a:t>locally</a:t>
+            </a:r>
+            <a:r>
+              <a:rPr lang="en-US" sz="2000" dirty="0">
                 <a:gradFill>
                   <a:gsLst>
                     <a:gs pos="0">
@@ -10254,7 +10391,145 @@
                   </a:outerShdw>
                 </a:effectLst>
               </a:rPr>
-              <a:t>. Local. Container. Kubernetes. CI/CD/GitOps pipeline.</a:t>
+              <a:t> or in </a:t>
+            </a:r>
+            <a:r>
+              <a:rPr lang="en-US" sz="2000" b="1" dirty="0">
+                <a:gradFill>
+                  <a:gsLst>
+                    <a:gs pos="0">
+                      <a:schemeClr val="accent4">
+                        <a:lumMod val="20000"/>
+                        <a:lumOff val="80000"/>
+                      </a:schemeClr>
+                    </a:gs>
+                    <a:gs pos="99000">
+                      <a:schemeClr val="bg1"/>
+                    </a:gs>
+                  </a:gsLst>
+                  <a:lin ang="0" scaled="0"/>
+                </a:gradFill>
+                <a:effectLst>
+                  <a:outerShdw blurRad="50800" dist="38100" dir="2700000" algn="tl" rotWithShape="0">
+                    <a:schemeClr val="accent4">
+                      <a:lumMod val="75000"/>
+                      <a:alpha val="40000"/>
+                    </a:schemeClr>
+                  </a:outerShdw>
+                </a:effectLst>
+              </a:rPr>
+              <a:t>Kubernetes</a:t>
+            </a:r>
+            <a:r>
+              <a:rPr lang="en-US" sz="2000" dirty="0">
+                <a:gradFill>
+                  <a:gsLst>
+                    <a:gs pos="0">
+                      <a:schemeClr val="accent4">
+                        <a:lumMod val="20000"/>
+                        <a:lumOff val="80000"/>
+                      </a:schemeClr>
+                    </a:gs>
+                    <a:gs pos="99000">
+                      <a:schemeClr val="bg1"/>
+                    </a:gs>
+                  </a:gsLst>
+                  <a:lin ang="0" scaled="0"/>
+                </a:gradFill>
+                <a:effectLst>
+                  <a:outerShdw blurRad="50800" dist="38100" dir="2700000" algn="tl" rotWithShape="0">
+                    <a:schemeClr val="accent4">
+                      <a:lumMod val="75000"/>
+                      <a:alpha val="40000"/>
+                    </a:schemeClr>
+                  </a:outerShdw>
+                </a:effectLst>
+              </a:rPr>
+              <a:t> </a:t>
+            </a:r>
+          </a:p>
+          <a:p>
+            <a:pPr algn="ctr"/>
+            <a:r>
+              <a:rPr lang="en-US" sz="2000" b="1" dirty="0">
+                <a:gradFill>
+                  <a:gsLst>
+                    <a:gs pos="0">
+                      <a:schemeClr val="accent4">
+                        <a:lumMod val="20000"/>
+                        <a:lumOff val="80000"/>
+                      </a:schemeClr>
+                    </a:gs>
+                    <a:gs pos="99000">
+                      <a:schemeClr val="bg1"/>
+                    </a:gs>
+                  </a:gsLst>
+                  <a:lin ang="0" scaled="0"/>
+                </a:gradFill>
+                <a:effectLst>
+                  <a:outerShdw blurRad="50800" dist="38100" dir="2700000" algn="tl" rotWithShape="0">
+                    <a:schemeClr val="accent4">
+                      <a:lumMod val="75000"/>
+                      <a:alpha val="40000"/>
+                    </a:schemeClr>
+                  </a:outerShdw>
+                </a:effectLst>
+              </a:rPr>
+              <a:t>Notifications </a:t>
+            </a:r>
+            <a:r>
+              <a:rPr lang="en-US" sz="2000" dirty="0">
+                <a:gradFill>
+                  <a:gsLst>
+                    <a:gs pos="0">
+                      <a:schemeClr val="accent4">
+                        <a:lumMod val="20000"/>
+                        <a:lumOff val="80000"/>
+                      </a:schemeClr>
+                    </a:gs>
+                    <a:gs pos="99000">
+                      <a:schemeClr val="bg1"/>
+                    </a:gs>
+                  </a:gsLst>
+                  <a:lin ang="0" scaled="0"/>
+                </a:gradFill>
+                <a:effectLst>
+                  <a:outerShdw blurRad="50800" dist="38100" dir="2700000" algn="tl" rotWithShape="0">
+                    <a:schemeClr val="accent4">
+                      <a:lumMod val="75000"/>
+                      <a:alpha val="40000"/>
+                    </a:schemeClr>
+                  </a:outerShdw>
+                </a:effectLst>
+              </a:rPr>
+              <a:t>&amp;</a:t>
+            </a:r>
+            <a:r>
+              <a:rPr lang="en-US" sz="2000" b="1" dirty="0">
+                <a:gradFill>
+                  <a:gsLst>
+                    <a:gs pos="0">
+                      <a:schemeClr val="accent4">
+                        <a:lumMod val="20000"/>
+                        <a:lumOff val="80000"/>
+                      </a:schemeClr>
+                    </a:gs>
+                    <a:gs pos="99000">
+                      <a:schemeClr val="bg1"/>
+                    </a:gs>
+                  </a:gsLst>
+                  <a:lin ang="0" scaled="0"/>
+                </a:gradFill>
+                <a:effectLst>
+                  <a:outerShdw blurRad="50800" dist="38100" dir="2700000" algn="tl" rotWithShape="0">
+                    <a:schemeClr val="accent4">
+                      <a:lumMod val="75000"/>
+                      <a:alpha val="40000"/>
+                    </a:schemeClr>
+                  </a:outerShdw>
+                </a:effectLst>
+              </a:rPr>
+              <a:t> Reporting</a:t>
             </a:r>
           </a:p>
         </p:txBody>
@@ -10271,14 +10546,13 @@
           <p:cNvCxnSpPr>
             <a:cxnSpLocks/>
             <a:stCxn id="45" idx="4"/>
-            <a:endCxn id="86" idx="0"/>
           </p:cNvCxnSpPr>
           <p:nvPr/>
         </p:nvCxnSpPr>
         <p:spPr>
           <a:xfrm>
-            <a:off x="6085848" y="3838204"/>
-            <a:ext cx="10149" cy="462425"/>
+            <a:off x="6085848" y="3670039"/>
+            <a:ext cx="0" cy="475141"/>
           </a:xfrm>
           <a:prstGeom prst="straightConnector1">
             <a:avLst/>
@@ -10325,7 +10599,7 @@
         </p:nvCxnSpPr>
         <p:spPr>
           <a:xfrm flipH="1">
-            <a:off x="4726272" y="4278346"/>
+            <a:off x="4737976" y="4145180"/>
             <a:ext cx="2716047" cy="0"/>
           </a:xfrm>
           <a:prstGeom prst="straightConnector1">
@@ -10364,59 +10638,6 @@
           </a:fontRef>
         </p:style>
       </p:cxnSp>
-      <p:cxnSp>
-        <p:nvCxnSpPr>
-          <p:cNvPr id="33" name="Straight Arrow Connector 32">
-            <a:extLst>
-              <a:ext uri="{FF2B5EF4-FFF2-40B4-BE49-F238E27FC236}">
-                <a16:creationId xmlns:a16="http://schemas.microsoft.com/office/drawing/2014/main" id="{FD43408C-8FD1-2A45-BAFA-7C30E55C1B43}"/>
-              </a:ext>
-            </a:extLst>
-          </p:cNvPr>
-          <p:cNvCxnSpPr>
-            <a:cxnSpLocks/>
-            <a:stCxn id="45" idx="5"/>
-          </p:cNvCxnSpPr>
-          <p:nvPr/>
-        </p:nvCxnSpPr>
-        <p:spPr>
-          <a:xfrm>
-            <a:off x="6480261" y="3674338"/>
-            <a:ext cx="2793477" cy="0"/>
-          </a:xfrm>
-          <a:prstGeom prst="straightConnector1">
-            <a:avLst/>
-          </a:prstGeom>
-          <a:ln w="31750">
-            <a:gradFill>
-              <a:gsLst>
-                <a:gs pos="0">
-                  <a:schemeClr val="bg1"/>
-                </a:gs>
-                <a:gs pos="100000">
-                  <a:srgbClr val="B70703"/>
-                </a:gs>
-              </a:gsLst>
-              <a:lin ang="0" scaled="0"/>
-            </a:gradFill>
-            <a:tailEnd type="none"/>
-          </a:ln>
-        </p:spPr>
-        <p:style>
-          <a:lnRef idx="1">
-            <a:schemeClr val="accent1"/>
-          </a:lnRef>
-          <a:fillRef idx="0">
-            <a:schemeClr val="accent1"/>
-          </a:fillRef>
-          <a:effectRef idx="0">
-            <a:schemeClr val="accent1"/>
-          </a:effectRef>
-          <a:fontRef idx="minor">
-            <a:schemeClr val="tx1"/>
-          </a:fontRef>
-        </p:style>
-      </p:cxnSp>
       <p:sp>
         <p:nvSpPr>
           <p:cNvPr id="21" name="TextBox 20">
@@ -10431,8 +10652,8 @@
         </p:nvSpPr>
         <p:spPr>
           <a:xfrm>
-            <a:off x="2712578" y="2889486"/>
-            <a:ext cx="1838401" cy="584775"/>
+            <a:off x="2650292" y="2725465"/>
+            <a:ext cx="2436343" cy="707886"/>
           </a:xfrm>
           <a:prstGeom prst="rect">
             <a:avLst/>
@@ -10453,7 +10674,7 @@
           <a:lstStyle/>
           <a:p>
             <a:r>
-              <a:rPr lang="en-US" sz="1600" b="1" dirty="0">
+              <a:rPr lang="en-US" sz="2000" b="1" dirty="0">
                 <a:gradFill>
                   <a:gsLst>
                     <a:gs pos="0">
@@ -10477,12 +10698,12 @@
                   </a:outerShdw>
                 </a:effectLst>
               </a:rPr>
-              <a:t>Load testing/SLOs</a:t>
-            </a:r>
-          </a:p>
-          <a:p>
-            <a:r>
-              <a:rPr lang="en-US" sz="1600" dirty="0">
+              <a:t>Load testing</a:t>
+            </a:r>
+          </a:p>
+          <a:p>
+            <a:r>
+              <a:rPr lang="en-US" sz="2000" dirty="0">
                 <a:gradFill>
                   <a:gsLst>
                     <a:gs pos="0">
@@ -10506,7 +10727,7 @@
                   </a:outerShdw>
                 </a:effectLst>
               </a:rPr>
-              <a:t>with built-in metrics</a:t>
+              <a:t>with SLO validation</a:t>
             </a:r>
           </a:p>
         </p:txBody>
@@ -10525,8 +10746,8 @@
         </p:nvSpPr>
         <p:spPr>
           <a:xfrm>
-            <a:off x="7262272" y="3068282"/>
-            <a:ext cx="2011466" cy="584775"/>
+            <a:off x="6826829" y="2777831"/>
+            <a:ext cx="2596059" cy="707886"/>
           </a:xfrm>
           <a:prstGeom prst="rect">
             <a:avLst/>
@@ -10548,7 +10769,7 @@
           <a:p>
             <a:pPr algn="r"/>
             <a:r>
-              <a:rPr lang="en-US" sz="1600" b="1" dirty="0">
+              <a:rPr lang="en-US" sz="2000" b="1" dirty="0">
                 <a:gradFill>
                   <a:gsLst>
                     <a:gs pos="0">
@@ -10578,7 +10799,7 @@
           <a:p>
             <a:pPr algn="r"/>
             <a:r>
-              <a:rPr lang="en-US" sz="1600" dirty="0">
+              <a:rPr lang="en-US" sz="2000" dirty="0">
                 <a:gradFill>
                   <a:gsLst>
                     <a:gs pos="0">
@@ -10602,7 +10823,7 @@
                   </a:outerShdw>
                 </a:effectLst>
               </a:rPr>
-              <a:t>with business metrics</a:t>
+              <a:t>for business growth</a:t>
             </a:r>
           </a:p>
         </p:txBody>
@@ -10623,8 +10844,8 @@
         </p:nvCxnSpPr>
         <p:spPr>
           <a:xfrm>
-            <a:off x="6079398" y="2273607"/>
-            <a:ext cx="4897" cy="442895"/>
+            <a:off x="6079398" y="2105442"/>
+            <a:ext cx="0" cy="442895"/>
           </a:xfrm>
           <a:prstGeom prst="straightConnector1">
             <a:avLst/>
@@ -10671,7 +10892,7 @@
         </p:nvCxnSpPr>
         <p:spPr>
           <a:xfrm flipH="1">
-            <a:off x="4721374" y="2273607"/>
+            <a:off x="4721374" y="2105442"/>
             <a:ext cx="2716047" cy="0"/>
           </a:xfrm>
           <a:prstGeom prst="straightConnector1">
@@ -10724,8 +10945,8 @@
         </p:nvSpPr>
         <p:spPr>
           <a:xfrm>
-            <a:off x="4046484" y="1899037"/>
-            <a:ext cx="4078014" cy="338554"/>
+            <a:off x="3677551" y="1696796"/>
+            <a:ext cx="4795573" cy="400110"/>
           </a:xfrm>
           <a:prstGeom prst="rect">
             <a:avLst/>
@@ -10747,7 +10968,7 @@
           <a:p>
             <a:pPr algn="ctr"/>
             <a:r>
-              <a:rPr lang="en-US" sz="1600" dirty="0">
+              <a:rPr lang="en-US" sz="2000" dirty="0">
                 <a:gradFill>
                   <a:gsLst>
                     <a:gs pos="0">
@@ -10774,7 +10995,7 @@
               <a:t>Use with </a:t>
             </a:r>
             <a:r>
-              <a:rPr lang="en-US" sz="1600" b="1" dirty="0">
+              <a:rPr lang="en-US" sz="2000" b="1" dirty="0">
                 <a:gradFill>
                   <a:gsLst>
                     <a:gs pos="0">
@@ -10801,7 +11022,7 @@
               <a:t>any </a:t>
             </a:r>
             <a:r>
-              <a:rPr lang="en-US" sz="1600" dirty="0">
+              <a:rPr lang="en-US" sz="2000" dirty="0">
                 <a:gradFill>
                   <a:gsLst>
                     <a:gs pos="0">
@@ -10825,15 +11046,68 @@
                   </a:outerShdw>
                 </a:effectLst>
               </a:rPr>
-              <a:t>app/serverless/ML framework. </a:t>
-            </a:r>
-          </a:p>
-        </p:txBody>
-      </p:sp>
+              <a:t>app/serverless/ML framework</a:t>
+            </a:r>
+          </a:p>
+        </p:txBody>
+      </p:sp>
+      <p:cxnSp>
+        <p:nvCxnSpPr>
+          <p:cNvPr id="17" name="Straight Arrow Connector 16">
+            <a:extLst>
+              <a:ext uri="{FF2B5EF4-FFF2-40B4-BE49-F238E27FC236}">
+                <a16:creationId xmlns:a16="http://schemas.microsoft.com/office/drawing/2014/main" id="{1F33487F-230E-394B-AC71-9D6DE82963E9}"/>
+              </a:ext>
+            </a:extLst>
+          </p:cNvPr>
+          <p:cNvCxnSpPr>
+            <a:cxnSpLocks/>
+            <a:endCxn id="45" idx="5"/>
+          </p:cNvCxnSpPr>
+          <p:nvPr/>
+        </p:nvCxnSpPr>
+        <p:spPr>
+          <a:xfrm flipH="1" flipV="1">
+            <a:off x="6480261" y="3506173"/>
+            <a:ext cx="2944368" cy="0"/>
+          </a:xfrm>
+          <a:prstGeom prst="straightConnector1">
+            <a:avLst/>
+          </a:prstGeom>
+          <a:ln w="31750">
+            <a:gradFill>
+              <a:gsLst>
+                <a:gs pos="0">
+                  <a:schemeClr val="bg1"/>
+                </a:gs>
+                <a:gs pos="100000">
+                  <a:srgbClr val="B70703"/>
+                </a:gs>
+              </a:gsLst>
+              <a:lin ang="0" scaled="0"/>
+            </a:gradFill>
+            <a:tailEnd type="none"/>
+          </a:ln>
+        </p:spPr>
+        <p:style>
+          <a:lnRef idx="1">
+            <a:schemeClr val="accent1"/>
+          </a:lnRef>
+          <a:fillRef idx="0">
+            <a:schemeClr val="accent1"/>
+          </a:fillRef>
+          <a:effectRef idx="0">
+            <a:schemeClr val="accent1"/>
+          </a:effectRef>
+          <a:fontRef idx="minor">
+            <a:schemeClr val="tx1"/>
+          </a:fontRef>
+        </p:style>
+      </p:cxnSp>
     </p:spTree>
     <p:extLst>
       <p:ext uri="{BB962C8B-B14F-4D97-AF65-F5344CB8AC3E}">
-        <p14:creationId xmlns:p14="http://schemas.microsoft.com/office/powerpoint/2010/main" val="2058438647"/>
+        <p14:creationId xmlns:p14="http://schemas.microsoft.com/office/powerpoint/2010/main" val="3248554908"/>
       </p:ext>
     </p:extLst>
   </p:cSld>

</xml_diff>